<commit_message>
Zvýšenie počtu vrstiev Dosiahnutie vyššej úspešnosti a konzistencie siete
</commit_message>
<xml_diff>
--- a/Klasifikácia_hviezd_Tariška.pptx
+++ b/Klasifikácia_hviezd_Tariška.pptx
@@ -225,7 +225,7 @@
           <a:p>
             <a:fld id="{FC0A8845-9B61-419C-896C-B68FF544C907}" type="datetimeFigureOut">
               <a:rPr lang="sk-SK" smtClean="0"/>
-              <a:t>6.5.2020</a:t>
+              <a:t>8.5.2020</a:t>
             </a:fld>
             <a:endParaRPr lang="sk-SK"/>
           </a:p>
@@ -662,7 +662,7 @@
           <a:p>
             <a:fld id="{F12FF047-AEA3-4A9A-82A0-8E0DF4580F55}" type="datetimeFigureOut">
               <a:rPr lang="sk-SK" smtClean="0"/>
-              <a:t>6.5.2020</a:t>
+              <a:t>8.5.2020</a:t>
             </a:fld>
             <a:endParaRPr lang="sk-SK"/>
           </a:p>
@@ -929,7 +929,7 @@
           <a:p>
             <a:fld id="{F12FF047-AEA3-4A9A-82A0-8E0DF4580F55}" type="datetimeFigureOut">
               <a:rPr lang="sk-SK" smtClean="0"/>
-              <a:t>6.5.2020</a:t>
+              <a:t>8.5.2020</a:t>
             </a:fld>
             <a:endParaRPr lang="sk-SK"/>
           </a:p>
@@ -1160,7 +1160,7 @@
           <a:p>
             <a:fld id="{F12FF047-AEA3-4A9A-82A0-8E0DF4580F55}" type="datetimeFigureOut">
               <a:rPr lang="sk-SK" smtClean="0"/>
-              <a:t>6.5.2020</a:t>
+              <a:t>8.5.2020</a:t>
             </a:fld>
             <a:endParaRPr lang="sk-SK"/>
           </a:p>
@@ -1470,7 +1470,7 @@
           <a:p>
             <a:fld id="{F12FF047-AEA3-4A9A-82A0-8E0DF4580F55}" type="datetimeFigureOut">
               <a:rPr lang="sk-SK" smtClean="0"/>
-              <a:t>6.5.2020</a:t>
+              <a:t>8.5.2020</a:t>
             </a:fld>
             <a:endParaRPr lang="sk-SK"/>
           </a:p>
@@ -1943,7 +1943,7 @@
           <a:p>
             <a:fld id="{F12FF047-AEA3-4A9A-82A0-8E0DF4580F55}" type="datetimeFigureOut">
               <a:rPr lang="sk-SK" smtClean="0"/>
-              <a:t>6.5.2020</a:t>
+              <a:t>8.5.2020</a:t>
             </a:fld>
             <a:endParaRPr lang="sk-SK"/>
           </a:p>
@@ -2490,7 +2490,7 @@
           <a:p>
             <a:fld id="{F12FF047-AEA3-4A9A-82A0-8E0DF4580F55}" type="datetimeFigureOut">
               <a:rPr lang="sk-SK" smtClean="0"/>
-              <a:t>6.5.2020</a:t>
+              <a:t>8.5.2020</a:t>
             </a:fld>
             <a:endParaRPr lang="sk-SK"/>
           </a:p>
@@ -3264,7 +3264,7 @@
           <a:p>
             <a:fld id="{F12FF047-AEA3-4A9A-82A0-8E0DF4580F55}" type="datetimeFigureOut">
               <a:rPr lang="sk-SK" smtClean="0"/>
-              <a:t>6.5.2020</a:t>
+              <a:t>8.5.2020</a:t>
             </a:fld>
             <a:endParaRPr lang="sk-SK"/>
           </a:p>
@@ -3439,7 +3439,7 @@
           <a:p>
             <a:fld id="{F12FF047-AEA3-4A9A-82A0-8E0DF4580F55}" type="datetimeFigureOut">
               <a:rPr lang="sk-SK" smtClean="0"/>
-              <a:t>6.5.2020</a:t>
+              <a:t>8.5.2020</a:t>
             </a:fld>
             <a:endParaRPr lang="sk-SK"/>
           </a:p>
@@ -3662,7 +3662,7 @@
           <a:p>
             <a:fld id="{F12FF047-AEA3-4A9A-82A0-8E0DF4580F55}" type="datetimeFigureOut">
               <a:rPr lang="sk-SK" smtClean="0"/>
-              <a:t>6.5.2020</a:t>
+              <a:t>8.5.2020</a:t>
             </a:fld>
             <a:endParaRPr lang="sk-SK"/>
           </a:p>
@@ -3842,7 +3842,7 @@
           <a:p>
             <a:fld id="{F12FF047-AEA3-4A9A-82A0-8E0DF4580F55}" type="datetimeFigureOut">
               <a:rPr lang="sk-SK" smtClean="0"/>
-              <a:t>6.5.2020</a:t>
+              <a:t>8.5.2020</a:t>
             </a:fld>
             <a:endParaRPr lang="sk-SK"/>
           </a:p>
@@ -4131,7 +4131,7 @@
           <a:p>
             <a:fld id="{F12FF047-AEA3-4A9A-82A0-8E0DF4580F55}" type="datetimeFigureOut">
               <a:rPr lang="sk-SK" smtClean="0"/>
-              <a:t>6.5.2020</a:t>
+              <a:t>8.5.2020</a:t>
             </a:fld>
             <a:endParaRPr lang="sk-SK"/>
           </a:p>
@@ -4373,7 +4373,7 @@
           <a:p>
             <a:fld id="{F12FF047-AEA3-4A9A-82A0-8E0DF4580F55}" type="datetimeFigureOut">
               <a:rPr lang="sk-SK" smtClean="0"/>
-              <a:t>6.5.2020</a:t>
+              <a:t>8.5.2020</a:t>
             </a:fld>
             <a:endParaRPr lang="sk-SK"/>
           </a:p>
@@ -4752,7 +4752,7 @@
           <a:p>
             <a:fld id="{F12FF047-AEA3-4A9A-82A0-8E0DF4580F55}" type="datetimeFigureOut">
               <a:rPr lang="sk-SK" smtClean="0"/>
-              <a:t>6.5.2020</a:t>
+              <a:t>8.5.2020</a:t>
             </a:fld>
             <a:endParaRPr lang="sk-SK"/>
           </a:p>
@@ -4870,7 +4870,7 @@
           <a:p>
             <a:fld id="{F12FF047-AEA3-4A9A-82A0-8E0DF4580F55}" type="datetimeFigureOut">
               <a:rPr lang="sk-SK" smtClean="0"/>
-              <a:t>6.5.2020</a:t>
+              <a:t>8.5.2020</a:t>
             </a:fld>
             <a:endParaRPr lang="sk-SK"/>
           </a:p>
@@ -4965,7 +4965,7 @@
           <a:p>
             <a:fld id="{F12FF047-AEA3-4A9A-82A0-8E0DF4580F55}" type="datetimeFigureOut">
               <a:rPr lang="sk-SK" smtClean="0"/>
-              <a:t>6.5.2020</a:t>
+              <a:t>8.5.2020</a:t>
             </a:fld>
             <a:endParaRPr lang="sk-SK"/>
           </a:p>
@@ -5214,7 +5214,7 @@
           <a:p>
             <a:fld id="{F12FF047-AEA3-4A9A-82A0-8E0DF4580F55}" type="datetimeFigureOut">
               <a:rPr lang="sk-SK" smtClean="0"/>
-              <a:t>6.5.2020</a:t>
+              <a:t>8.5.2020</a:t>
             </a:fld>
             <a:endParaRPr lang="sk-SK"/>
           </a:p>
@@ -5471,7 +5471,7 @@
           <a:p>
             <a:fld id="{F12FF047-AEA3-4A9A-82A0-8E0DF4580F55}" type="datetimeFigureOut">
               <a:rPr lang="sk-SK" smtClean="0"/>
-              <a:t>6.5.2020</a:t>
+              <a:t>8.5.2020</a:t>
             </a:fld>
             <a:endParaRPr lang="sk-SK"/>
           </a:p>
@@ -5714,7 +5714,7 @@
           <a:p>
             <a:fld id="{F12FF047-AEA3-4A9A-82A0-8E0DF4580F55}" type="datetimeFigureOut">
               <a:rPr lang="sk-SK" smtClean="0"/>
-              <a:t>6.5.2020</a:t>
+              <a:t>8.5.2020</a:t>
             </a:fld>
             <a:endParaRPr lang="sk-SK"/>
           </a:p>
@@ -6236,7 +6236,12 @@
             <p:ph type="title"/>
           </p:nvPr>
         </p:nvSpPr>
-        <p:spPr/>
+        <p:spPr>
+          <a:xfrm>
+            <a:off x="2895600" y="764373"/>
+            <a:ext cx="5769006" cy="1293028"/>
+          </a:xfrm>
+        </p:spPr>
         <p:txBody>
           <a:bodyPr/>
           <a:lstStyle/>
@@ -6303,7 +6308,7 @@
           <a:p>
             <a:r>
               <a:rPr lang="sk-SK" dirty="0"/>
-              <a:t>3 skryté vrstvy po 100 neurónov, akt. Funkcia </a:t>
+              <a:t>6 skrytých vrstiev po 100 neurónov, akt. Funkcia </a:t>
             </a:r>
             <a:r>
               <a:rPr lang="sk-SK" dirty="0" err="1"/>
@@ -6388,15 +6393,20 @@
           <p:nvPr/>
         </p:nvPicPr>
         <p:blipFill>
-          <a:blip r:embed="rId2"/>
-          <a:stretch>
-            <a:fillRect/>
-          </a:stretch>
+          <a:blip r:embed="rId2">
+            <a:extLst>
+              <a:ext uri="{28A0092B-C50C-407E-A947-70E740481C1C}">
+                <a14:useLocalDpi xmlns:a14="http://schemas.microsoft.com/office/drawing/2010/main" val="0"/>
+              </a:ext>
+            </a:extLst>
+          </a:blip>
+          <a:srcRect/>
+          <a:stretch/>
         </p:blipFill>
         <p:spPr>
           <a:xfrm>
-            <a:off x="8581393" y="2057401"/>
-            <a:ext cx="2202371" cy="3977985"/>
+            <a:off x="9081446" y="519474"/>
+            <a:ext cx="2015641" cy="6126395"/>
           </a:xfrm>
           <a:prstGeom prst="rect">
             <a:avLst/>
@@ -6475,16 +6485,21 @@
           </p:cNvPicPr>
           <p:nvPr/>
         </p:nvPicPr>
-        <p:blipFill>
-          <a:blip r:embed="rId2"/>
-          <a:stretch>
-            <a:fillRect/>
-          </a:stretch>
+        <p:blipFill rotWithShape="1">
+          <a:blip r:embed="rId2">
+            <a:extLst>
+              <a:ext uri="{28A0092B-C50C-407E-A947-70E740481C1C}">
+                <a14:useLocalDpi xmlns:a14="http://schemas.microsoft.com/office/drawing/2010/main" val="0"/>
+              </a:ext>
+            </a:extLst>
+          </a:blip>
+          <a:srcRect b="5423"/>
+          <a:stretch/>
         </p:blipFill>
         <p:spPr>
           <a:xfrm>
-            <a:off x="685800" y="1624896"/>
-            <a:ext cx="6035044" cy="1234440"/>
+            <a:off x="685800" y="1481911"/>
+            <a:ext cx="4302743" cy="1376701"/>
           </a:xfrm>
           <a:prstGeom prst="rect">
             <a:avLst/>
@@ -6536,15 +6551,20 @@
           <p:nvPr/>
         </p:nvPicPr>
         <p:blipFill>
-          <a:blip r:embed="rId4"/>
-          <a:stretch>
-            <a:fillRect/>
-          </a:stretch>
+          <a:blip r:embed="rId4">
+            <a:extLst>
+              <a:ext uri="{28A0092B-C50C-407E-A947-70E740481C1C}">
+                <a14:useLocalDpi xmlns:a14="http://schemas.microsoft.com/office/drawing/2010/main" val="0"/>
+              </a:ext>
+            </a:extLst>
+          </a:blip>
+          <a:srcRect/>
+          <a:stretch/>
         </p:blipFill>
         <p:spPr>
           <a:xfrm>
-            <a:off x="1327273" y="3861385"/>
-            <a:ext cx="8809483" cy="2743438"/>
+            <a:off x="1149719" y="3863010"/>
+            <a:ext cx="8809483" cy="2598145"/>
           </a:xfrm>
           <a:prstGeom prst="rect">
             <a:avLst/>
@@ -6833,15 +6853,20 @@
           </p:nvPr>
         </p:nvPicPr>
         <p:blipFill>
-          <a:blip r:embed="rId2"/>
-          <a:stretch>
-            <a:fillRect/>
-          </a:stretch>
+          <a:blip r:embed="rId2">
+            <a:extLst>
+              <a:ext uri="{28A0092B-C50C-407E-A947-70E740481C1C}">
+                <a14:useLocalDpi xmlns:a14="http://schemas.microsoft.com/office/drawing/2010/main" val="0"/>
+              </a:ext>
+            </a:extLst>
+          </a:blip>
+          <a:srcRect/>
+          <a:stretch/>
         </p:blipFill>
         <p:spPr>
           <a:xfrm>
             <a:off x="1036097" y="2341486"/>
-            <a:ext cx="4482491" cy="4007651"/>
+            <a:ext cx="4482491" cy="3990788"/>
           </a:xfrm>
           <a:prstGeom prst="rect">
             <a:avLst/>
@@ -6863,15 +6888,20 @@
           <p:nvPr/>
         </p:nvPicPr>
         <p:blipFill>
-          <a:blip r:embed="rId3"/>
-          <a:stretch>
-            <a:fillRect/>
-          </a:stretch>
+          <a:blip r:embed="rId3">
+            <a:extLst>
+              <a:ext uri="{28A0092B-C50C-407E-A947-70E740481C1C}">
+                <a14:useLocalDpi xmlns:a14="http://schemas.microsoft.com/office/drawing/2010/main" val="0"/>
+              </a:ext>
+            </a:extLst>
+          </a:blip>
+          <a:srcRect/>
+          <a:stretch/>
         </p:blipFill>
         <p:spPr>
           <a:xfrm>
-            <a:off x="6673413" y="2341486"/>
-            <a:ext cx="4301357" cy="4007651"/>
+            <a:off x="6673413" y="2413061"/>
+            <a:ext cx="4301357" cy="3864500"/>
           </a:xfrm>
           <a:prstGeom prst="rect">
             <a:avLst/>
@@ -6951,15 +6981,20 @@
           <p:nvPr/>
         </p:nvPicPr>
         <p:blipFill>
-          <a:blip r:embed="rId2"/>
-          <a:stretch>
-            <a:fillRect/>
-          </a:stretch>
+          <a:blip r:embed="rId2">
+            <a:extLst>
+              <a:ext uri="{28A0092B-C50C-407E-A947-70E740481C1C}">
+                <a14:useLocalDpi xmlns:a14="http://schemas.microsoft.com/office/drawing/2010/main" val="0"/>
+              </a:ext>
+            </a:extLst>
+          </a:blip>
+          <a:srcRect/>
+          <a:stretch/>
         </p:blipFill>
         <p:spPr>
           <a:xfrm>
-            <a:off x="1172035" y="2441442"/>
-            <a:ext cx="4136812" cy="3865249"/>
+            <a:off x="1174148" y="2441442"/>
+            <a:ext cx="4132586" cy="3865249"/>
           </a:xfrm>
           <a:prstGeom prst="rect">
             <a:avLst/>
@@ -6981,15 +7016,20 @@
           <p:nvPr/>
         </p:nvPicPr>
         <p:blipFill>
-          <a:blip r:embed="rId3"/>
-          <a:stretch>
-            <a:fillRect/>
-          </a:stretch>
+          <a:blip r:embed="rId3">
+            <a:extLst>
+              <a:ext uri="{28A0092B-C50C-407E-A947-70E740481C1C}">
+                <a14:useLocalDpi xmlns:a14="http://schemas.microsoft.com/office/drawing/2010/main" val="0"/>
+              </a:ext>
+            </a:extLst>
+          </a:blip>
+          <a:srcRect/>
+          <a:stretch/>
         </p:blipFill>
         <p:spPr>
           <a:xfrm>
-            <a:off x="6406718" y="2425014"/>
-            <a:ext cx="4136811" cy="3881677"/>
+            <a:off x="6445561" y="2425014"/>
+            <a:ext cx="4059125" cy="3881677"/>
           </a:xfrm>
           <a:prstGeom prst="rect">
             <a:avLst/>
@@ -7073,7 +7113,7 @@
         <p:spPr>
           <a:xfrm>
             <a:off x="685800" y="2194560"/>
-            <a:ext cx="10820400" cy="1915801"/>
+            <a:ext cx="10820400" cy="3282962"/>
           </a:xfrm>
         </p:spPr>
         <p:txBody>
@@ -7103,7 +7143,7 @@
           <a:p>
             <a:r>
               <a:rPr lang="sk-SK" sz="2400" dirty="0"/>
-              <a:t>Dosiahnutá úspešnosť bola medzi 55% - 82% </a:t>
+              <a:t>Dosiahnutá úspešnosť bola medzi 75% - 85% </a:t>
             </a:r>
           </a:p>
           <a:p>
@@ -7113,7 +7153,16 @@
             </a:r>
           </a:p>
           <a:p>
-            <a:endParaRPr lang="sk-SK" sz="2400" dirty="0"/>
+            <a:r>
+              <a:rPr lang="sk-SK" sz="2400" dirty="0"/>
+              <a:t>Zvýšenie počtu skrytých vrstiev má pozitívny dopad na konzistenciu siete</a:t>
+            </a:r>
+          </a:p>
+          <a:p>
+            <a:r>
+              <a:rPr lang="sk-SK" sz="2400" dirty="0"/>
+              <a:t>Masívne zvýšenie počtu neurónov nemá takmer žiadny vplyv na výšku percenta úspešnosti</a:t>
+            </a:r>
           </a:p>
         </p:txBody>
       </p:sp>
@@ -8386,15 +8435,20 @@
           <p:nvPr/>
         </p:nvPicPr>
         <p:blipFill>
-          <a:blip r:embed="rId2"/>
-          <a:stretch>
-            <a:fillRect/>
-          </a:stretch>
+          <a:blip r:embed="rId2">
+            <a:extLst>
+              <a:ext uri="{28A0092B-C50C-407E-A947-70E740481C1C}">
+                <a14:useLocalDpi xmlns:a14="http://schemas.microsoft.com/office/drawing/2010/main" val="0"/>
+              </a:ext>
+            </a:extLst>
+          </a:blip>
+          <a:srcRect/>
+          <a:stretch/>
         </p:blipFill>
         <p:spPr>
           <a:xfrm>
-            <a:off x="812567" y="2857914"/>
-            <a:ext cx="4708574" cy="2944187"/>
+            <a:off x="924170" y="2857914"/>
+            <a:ext cx="4485368" cy="2944187"/>
           </a:xfrm>
           <a:prstGeom prst="rect">
             <a:avLst/>
@@ -8416,15 +8470,20 @@
           <p:nvPr/>
         </p:nvPicPr>
         <p:blipFill>
-          <a:blip r:embed="rId3"/>
-          <a:stretch>
-            <a:fillRect/>
-          </a:stretch>
+          <a:blip r:embed="rId3">
+            <a:extLst>
+              <a:ext uri="{28A0092B-C50C-407E-A947-70E740481C1C}">
+                <a14:useLocalDpi xmlns:a14="http://schemas.microsoft.com/office/drawing/2010/main" val="0"/>
+              </a:ext>
+            </a:extLst>
+          </a:blip>
+          <a:srcRect/>
+          <a:stretch/>
         </p:blipFill>
         <p:spPr>
           <a:xfrm>
-            <a:off x="6795146" y="2827387"/>
-            <a:ext cx="4708574" cy="3005242"/>
+            <a:off x="6559256" y="2840257"/>
+            <a:ext cx="4708574" cy="2961844"/>
           </a:xfrm>
           <a:prstGeom prst="rect">
             <a:avLst/>

</xml_diff>